<commit_message>
Fix bug:remove time T Z from brief vo
</commit_message>
<xml_diff>
--- a/Doc/迭代二/团队分工报告.pptx
+++ b/Doc/迭代二/团队分工报告.pptx
@@ -1271,21 +1271,21 @@
   </dgm:ptLst>
   <dgm:cxnLst>
     <dgm:cxn modelId="{C098E3A2-2D4C-45A9-831E-DCE7169BA915}" type="presOf" srcId="{48F319E6-4F96-4B39-AABC-1766A9D1D3B7}" destId="{51A9379B-ECD6-421A-818A-A5A491DDB5E2}" srcOrd="1" destOrd="0" presId="urn:microsoft.com/office/officeart/2008/layout/HalfCircleOrganizationChart"/>
-    <dgm:cxn modelId="{CD78242C-AE3C-40B6-8BFE-A9FE53D9828C}" type="presOf" srcId="{6F6BF171-4AB0-4A21-BC02-7E50B4F897F7}" destId="{DAA4E54F-A8B9-4CA3-A65D-CCEA28759B4F}" srcOrd="1" destOrd="0" presId="urn:microsoft.com/office/officeart/2008/layout/HalfCircleOrganizationChart"/>
-    <dgm:cxn modelId="{CAD83745-73EA-493C-9B4B-8D5ACA0DDAD6}" type="presOf" srcId="{997C0A63-00A4-4AD3-AADE-F7FB98A5F126}" destId="{1CC7B5C3-F23F-414A-9A42-45F422104BB3}" srcOrd="0" destOrd="0" presId="urn:microsoft.com/office/officeart/2008/layout/HalfCircleOrganizationChart"/>
-    <dgm:cxn modelId="{C407EB7F-1D41-4384-88A3-820F8E37CF8D}" type="presOf" srcId="{6F6BF171-4AB0-4A21-BC02-7E50B4F897F7}" destId="{6BB01F85-E985-41FD-B41E-0C8009B7126D}" srcOrd="0" destOrd="0" presId="urn:microsoft.com/office/officeart/2008/layout/HalfCircleOrganizationChart"/>
     <dgm:cxn modelId="{FC127CEC-21EB-47F3-9ED0-DB2DF94BF1B0}" type="presOf" srcId="{700A4BCA-6CCA-4F36-8383-F3E723422809}" destId="{85E8219A-3D5E-46B9-9394-C59BE6536567}" srcOrd="1" destOrd="0" presId="urn:microsoft.com/office/officeart/2008/layout/HalfCircleOrganizationChart"/>
     <dgm:cxn modelId="{AF8D8BD3-856F-45B1-9FC1-DA5444519F1D}" srcId="{09F3501A-6962-45ED-999D-6C596A92F621}" destId="{700A4BCA-6CCA-4F36-8383-F3E723422809}" srcOrd="0" destOrd="0" parTransId="{92CB5DA0-3776-4B36-B61C-1163FB7B5622}" sibTransId="{0E5EC18C-311F-42BE-BD33-7B6033C4B48A}"/>
+    <dgm:cxn modelId="{C2D5861F-D1C9-42DC-99D8-E02874E9ECE3}" type="presOf" srcId="{92CB5DA0-3776-4B36-B61C-1163FB7B5622}" destId="{C17F308B-16F2-444A-830A-5787223FD824}" srcOrd="0" destOrd="0" presId="urn:microsoft.com/office/officeart/2008/layout/HalfCircleOrganizationChart"/>
+    <dgm:cxn modelId="{319248A6-3519-4163-A558-A267A1EEED7A}" type="presOf" srcId="{58F58297-C61A-4E79-B58D-50DDF4D63D48}" destId="{2E172DFC-EA9C-4784-8E2F-10D228692819}" srcOrd="0" destOrd="0" presId="urn:microsoft.com/office/officeart/2008/layout/HalfCircleOrganizationChart"/>
+    <dgm:cxn modelId="{F99EE0B0-1E0D-45CE-869B-98BDD3CDC3EE}" type="presOf" srcId="{09F3501A-6962-45ED-999D-6C596A92F621}" destId="{6462D10F-13EB-4CCC-A03E-6E9146888DA7}" srcOrd="1" destOrd="0" presId="urn:microsoft.com/office/officeart/2008/layout/HalfCircleOrganizationChart"/>
+    <dgm:cxn modelId="{03BD6839-014D-4165-BA08-B4010EA446A8}" srcId="{09F3501A-6962-45ED-999D-6C596A92F621}" destId="{6F6BF171-4AB0-4A21-BC02-7E50B4F897F7}" srcOrd="2" destOrd="0" parTransId="{58F58297-C61A-4E79-B58D-50DDF4D63D48}" sibTransId="{8279ABE6-C85D-42B8-8890-9477C7AFCA15}"/>
+    <dgm:cxn modelId="{E2E7E31D-8EEB-4A34-8AB2-0C4182B18232}" type="presOf" srcId="{09F3501A-6962-45ED-999D-6C596A92F621}" destId="{47109D99-CC62-4295-ABCE-0FBE69009B31}" srcOrd="0" destOrd="0" presId="urn:microsoft.com/office/officeart/2008/layout/HalfCircleOrganizationChart"/>
+    <dgm:cxn modelId="{CAD83745-73EA-493C-9B4B-8D5ACA0DDAD6}" type="presOf" srcId="{997C0A63-00A4-4AD3-AADE-F7FB98A5F126}" destId="{1CC7B5C3-F23F-414A-9A42-45F422104BB3}" srcOrd="0" destOrd="0" presId="urn:microsoft.com/office/officeart/2008/layout/HalfCircleOrganizationChart"/>
+    <dgm:cxn modelId="{9D57B926-5F6A-4948-AA3B-BBDAC2DE8CF0}" srcId="{09F3501A-6962-45ED-999D-6C596A92F621}" destId="{48F319E6-4F96-4B39-AABC-1766A9D1D3B7}" srcOrd="1" destOrd="0" parTransId="{F9EB070B-B4C2-4AD2-B723-37B05A44975A}" sibTransId="{3B33F432-21AB-4288-A455-35B8291448C9}"/>
+    <dgm:cxn modelId="{C407EB7F-1D41-4384-88A3-820F8E37CF8D}" type="presOf" srcId="{6F6BF171-4AB0-4A21-BC02-7E50B4F897F7}" destId="{6BB01F85-E985-41FD-B41E-0C8009B7126D}" srcOrd="0" destOrd="0" presId="urn:microsoft.com/office/officeart/2008/layout/HalfCircleOrganizationChart"/>
+    <dgm:cxn modelId="{8ED8ECB9-060E-49B1-8A1E-A292632BF866}" type="presOf" srcId="{48F319E6-4F96-4B39-AABC-1766A9D1D3B7}" destId="{BEF3E5A4-7B8A-4EAE-8CEE-53806EFAFB78}" srcOrd="0" destOrd="0" presId="urn:microsoft.com/office/officeart/2008/layout/HalfCircleOrganizationChart"/>
+    <dgm:cxn modelId="{A223CEEA-DD9C-4FF6-B0D9-B175CB2E66FA}" srcId="{997C0A63-00A4-4AD3-AADE-F7FB98A5F126}" destId="{09F3501A-6962-45ED-999D-6C596A92F621}" srcOrd="0" destOrd="0" parTransId="{6ECBD3AB-0CF6-47A0-97FC-504DDCC5ECF4}" sibTransId="{7D2AEBBB-9BAC-4833-BD4F-26150316571D}"/>
+    <dgm:cxn modelId="{0CC99257-3F47-4EA7-A7BC-DAC80C5FFD67}" type="presOf" srcId="{700A4BCA-6CCA-4F36-8383-F3E723422809}" destId="{CDADD6DB-8FFF-47CB-8263-7CFD21F290A2}" srcOrd="0" destOrd="0" presId="urn:microsoft.com/office/officeart/2008/layout/HalfCircleOrganizationChart"/>
+    <dgm:cxn modelId="{CD78242C-AE3C-40B6-8BFE-A9FE53D9828C}" type="presOf" srcId="{6F6BF171-4AB0-4A21-BC02-7E50B4F897F7}" destId="{DAA4E54F-A8B9-4CA3-A65D-CCEA28759B4F}" srcOrd="1" destOrd="0" presId="urn:microsoft.com/office/officeart/2008/layout/HalfCircleOrganizationChart"/>
     <dgm:cxn modelId="{F9C5F8D9-DEE6-4A8F-87B9-D8050C8FAAD7}" type="presOf" srcId="{F9EB070B-B4C2-4AD2-B723-37B05A44975A}" destId="{5FCC399B-2D81-4E95-9672-F9FF5F48A3F9}" srcOrd="0" destOrd="0" presId="urn:microsoft.com/office/officeart/2008/layout/HalfCircleOrganizationChart"/>
-    <dgm:cxn modelId="{E2E7E31D-8EEB-4A34-8AB2-0C4182B18232}" type="presOf" srcId="{09F3501A-6962-45ED-999D-6C596A92F621}" destId="{47109D99-CC62-4295-ABCE-0FBE69009B31}" srcOrd="0" destOrd="0" presId="urn:microsoft.com/office/officeart/2008/layout/HalfCircleOrganizationChart"/>
-    <dgm:cxn modelId="{C2D5861F-D1C9-42DC-99D8-E02874E9ECE3}" type="presOf" srcId="{92CB5DA0-3776-4B36-B61C-1163FB7B5622}" destId="{C17F308B-16F2-444A-830A-5787223FD824}" srcOrd="0" destOrd="0" presId="urn:microsoft.com/office/officeart/2008/layout/HalfCircleOrganizationChart"/>
-    <dgm:cxn modelId="{0CC99257-3F47-4EA7-A7BC-DAC80C5FFD67}" type="presOf" srcId="{700A4BCA-6CCA-4F36-8383-F3E723422809}" destId="{CDADD6DB-8FFF-47CB-8263-7CFD21F290A2}" srcOrd="0" destOrd="0" presId="urn:microsoft.com/office/officeart/2008/layout/HalfCircleOrganizationChart"/>
-    <dgm:cxn modelId="{9D57B926-5F6A-4948-AA3B-BBDAC2DE8CF0}" srcId="{09F3501A-6962-45ED-999D-6C596A92F621}" destId="{48F319E6-4F96-4B39-AABC-1766A9D1D3B7}" srcOrd="1" destOrd="0" parTransId="{F9EB070B-B4C2-4AD2-B723-37B05A44975A}" sibTransId="{3B33F432-21AB-4288-A455-35B8291448C9}"/>
-    <dgm:cxn modelId="{A223CEEA-DD9C-4FF6-B0D9-B175CB2E66FA}" srcId="{997C0A63-00A4-4AD3-AADE-F7FB98A5F126}" destId="{09F3501A-6962-45ED-999D-6C596A92F621}" srcOrd="0" destOrd="0" parTransId="{6ECBD3AB-0CF6-47A0-97FC-504DDCC5ECF4}" sibTransId="{7D2AEBBB-9BAC-4833-BD4F-26150316571D}"/>
-    <dgm:cxn modelId="{03BD6839-014D-4165-BA08-B4010EA446A8}" srcId="{09F3501A-6962-45ED-999D-6C596A92F621}" destId="{6F6BF171-4AB0-4A21-BC02-7E50B4F897F7}" srcOrd="2" destOrd="0" parTransId="{58F58297-C61A-4E79-B58D-50DDF4D63D48}" sibTransId="{8279ABE6-C85D-42B8-8890-9477C7AFCA15}"/>
-    <dgm:cxn modelId="{319248A6-3519-4163-A558-A267A1EEED7A}" type="presOf" srcId="{58F58297-C61A-4E79-B58D-50DDF4D63D48}" destId="{2E172DFC-EA9C-4784-8E2F-10D228692819}" srcOrd="0" destOrd="0" presId="urn:microsoft.com/office/officeart/2008/layout/HalfCircleOrganizationChart"/>
-    <dgm:cxn modelId="{8ED8ECB9-060E-49B1-8A1E-A292632BF866}" type="presOf" srcId="{48F319E6-4F96-4B39-AABC-1766A9D1D3B7}" destId="{BEF3E5A4-7B8A-4EAE-8CEE-53806EFAFB78}" srcOrd="0" destOrd="0" presId="urn:microsoft.com/office/officeart/2008/layout/HalfCircleOrganizationChart"/>
-    <dgm:cxn modelId="{F99EE0B0-1E0D-45CE-869B-98BDD3CDC3EE}" type="presOf" srcId="{09F3501A-6962-45ED-999D-6C596A92F621}" destId="{6462D10F-13EB-4CCC-A03E-6E9146888DA7}" srcOrd="1" destOrd="0" presId="urn:microsoft.com/office/officeart/2008/layout/HalfCircleOrganizationChart"/>
     <dgm:cxn modelId="{AAEDDD76-3AD0-49CC-8143-B7D347AB94BB}" type="presParOf" srcId="{1CC7B5C3-F23F-414A-9A42-45F422104BB3}" destId="{B2E107E7-4F67-4440-B5B0-81B64B29C992}" srcOrd="0" destOrd="0" presId="urn:microsoft.com/office/officeart/2008/layout/HalfCircleOrganizationChart"/>
     <dgm:cxn modelId="{0B09B499-9247-4EB7-B801-3A71EEB3A456}" type="presParOf" srcId="{B2E107E7-4F67-4440-B5B0-81B64B29C992}" destId="{DDB7792F-697A-4540-B592-1F255D02DCAF}" srcOrd="0" destOrd="0" presId="urn:microsoft.com/office/officeart/2008/layout/HalfCircleOrganizationChart"/>
     <dgm:cxn modelId="{5296FBF0-A512-4B14-8121-762434B3F10C}" type="presParOf" srcId="{DDB7792F-697A-4540-B592-1F255D02DCAF}" destId="{47109D99-CC62-4295-ABCE-0FBE69009B31}" srcOrd="0" destOrd="0" presId="urn:microsoft.com/office/officeart/2008/layout/HalfCircleOrganizationChart"/>
@@ -9057,7 +9057,14 @@
                 <a:latin typeface="宋体" pitchFamily="2" charset="-122"/>
                 <a:ea typeface="宋体" pitchFamily="2" charset="-122"/>
               </a:rPr>
-              <a:t>戴新颜：服务器端数据更新和维护</a:t>
+              <a:t>戴新颜：服务器端</a:t>
+            </a:r>
+            <a:r>
+              <a:rPr lang="zh-CN" altLang="en-US">
+                <a:latin typeface="宋体" pitchFamily="2" charset="-122"/>
+                <a:ea typeface="宋体" pitchFamily="2" charset="-122"/>
+              </a:rPr>
+              <a:t>数据维护和界面</a:t>
             </a:r>
             <a:endParaRPr lang="en-US" dirty="0">
               <a:latin typeface="宋体" pitchFamily="2" charset="-122"/>

</xml_diff>